<commit_message>
Slides Template from CDS
</commit_message>
<xml_diff>
--- a/slides/IISc-CSA(CDS)-v2.potx.pptx
+++ b/slides/IISc-CSA(CDS)-v2.potx.pptx
@@ -28,18 +28,11 @@
       <p:boldItalic r:id="rId11"/>
     </p:embeddedFont>
     <p:embeddedFont>
-      <p:font typeface="Cousine" panose="020B0604020202020204" charset="0"/>
+      <p:font typeface="Economica" panose="020B0604020202020204" charset="0"/>
       <p:regular r:id="rId12"/>
       <p:bold r:id="rId13"/>
       <p:italic r:id="rId14"/>
       <p:boldItalic r:id="rId15"/>
-    </p:embeddedFont>
-    <p:embeddedFont>
-      <p:font typeface="Economica" panose="020B0604020202020204" charset="0"/>
-      <p:regular r:id="rId16"/>
-      <p:bold r:id="rId17"/>
-      <p:italic r:id="rId18"/>
-      <p:boldItalic r:id="rId19"/>
     </p:embeddedFont>
   </p:embeddedFontLst>
   <p:defaultTextStyle>
@@ -2200,2066 +2193,6 @@
           </a:p>
         </p:txBody>
       </p:sp>
-      <p:sp>
-        <p:nvSpPr>
-          <p:cNvPr id="38" name="Rectangle 1"/>
-          <p:cNvSpPr>
-            <a:spLocks noChangeArrowheads="1"/>
-          </p:cNvSpPr>
-          <p:nvPr userDrawn="1"/>
-        </p:nvSpPr>
-        <p:spPr bwMode="auto">
-          <a:xfrm>
-            <a:off x="916977" y="6224522"/>
-            <a:ext cx="7632190" cy="646331"/>
-          </a:xfrm>
-          <a:prstGeom prst="rect">
-            <a:avLst/>
-          </a:prstGeom>
-          <a:noFill/>
-          <a:ln>
-            <a:noFill/>
-          </a:ln>
-          <a:effectLst/>
-          <a:extLst>
-            <a:ext uri="{909E8E84-426E-40DD-AFC4-6F175D3DCCD1}">
-              <a14:hiddenFill xmlns:a14="http://schemas.microsoft.com/office/drawing/2010/main">
-                <a:solidFill>
-                  <a:schemeClr val="accent1"/>
-                </a:solidFill>
-              </a14:hiddenFill>
-            </a:ext>
-            <a:ext uri="{91240B29-F687-4F45-9708-019B960494DF}">
-              <a14:hiddenLine xmlns:a14="http://schemas.microsoft.com/office/drawing/2010/main" w="9525">
-                <a:solidFill>
-                  <a:schemeClr val="tx1"/>
-                </a:solidFill>
-                <a:miter lim="800000"/>
-                <a:headEnd/>
-                <a:tailEnd/>
-              </a14:hiddenLine>
-            </a:ext>
-            <a:ext uri="{AF507438-7753-43E0-B8FC-AC1667EBCBE1}">
-              <a14:hiddenEffects xmlns:a14="http://schemas.microsoft.com/office/drawing/2010/main">
-                <a:effectLst>
-                  <a:outerShdw dist="35921" dir="2700000" algn="ctr" rotWithShape="0">
-                    <a:schemeClr val="bg2"/>
-                  </a:outerShdw>
-                </a:effectLst>
-              </a14:hiddenEffects>
-            </a:ext>
-          </a:extLst>
-        </p:spPr>
-        <p:txBody>
-          <a:bodyPr vert="horz" wrap="square" lIns="91440" tIns="45720" rIns="91440" bIns="45720" numCol="1" anchor="ctr" anchorCtr="0" compatLnSpc="1">
-            <a:prstTxWarp prst="textNoShape">
-              <a:avLst/>
-            </a:prstTxWarp>
-            <a:spAutoFit/>
-          </a:bodyPr>
-          <a:lstStyle/>
-          <a:p>
-            <a:pPr lvl="0" eaLnBrk="0" fontAlgn="base" hangingPunct="0">
-              <a:spcBef>
-                <a:spcPct val="0"/>
-              </a:spcBef>
-              <a:spcAft>
-                <a:spcPct val="0"/>
-              </a:spcAft>
-            </a:pPr>
-            <a:r>
-              <a:rPr kumimoji="0" lang="en-US" sz="1200" b="0" i="1" u="none" strike="noStrike" cap="none" normalizeH="0" baseline="0" dirty="0">
-                <a:ln>
-                  <a:noFill/>
-                </a:ln>
-                <a:solidFill>
-                  <a:schemeClr val="tx2">
-                    <a:lumMod val="20000"/>
-                    <a:lumOff val="80000"/>
-                  </a:schemeClr>
-                </a:solidFill>
-                <a:effectLst/>
-                <a:latin typeface="+mn-lt"/>
-              </a:rPr>
-              <a:t>©Department of Computational and Data Science, IISc, 2016</a:t>
-            </a:r>
-            <a:br>
-              <a:rPr kumimoji="0" lang="en-US" sz="1200" b="0" i="1" u="none" strike="noStrike" cap="none" normalizeH="0" baseline="0" dirty="0">
-                <a:ln>
-                  <a:noFill/>
-                </a:ln>
-                <a:solidFill>
-                  <a:schemeClr val="tx2">
-                    <a:lumMod val="20000"/>
-                    <a:lumOff val="80000"/>
-                  </a:schemeClr>
-                </a:solidFill>
-                <a:effectLst/>
-                <a:latin typeface="+mn-lt"/>
-              </a:rPr>
-            </a:br>
-            <a:r>
-              <a:rPr lang="en-IN" sz="1200" i="1" dirty="0">
-                <a:solidFill>
-                  <a:schemeClr val="tx2">
-                    <a:lumMod val="20000"/>
-                    <a:lumOff val="80000"/>
-                  </a:schemeClr>
-                </a:solidFill>
-                <a:latin typeface="+mn-lt"/>
-              </a:rPr>
-              <a:t>This work is licensed under a </a:t>
-            </a:r>
-            <a:r>
-              <a:rPr lang="en-IN" sz="1200" i="1" dirty="0">
-                <a:solidFill>
-                  <a:schemeClr val="tx2">
-                    <a:lumMod val="20000"/>
-                    <a:lumOff val="80000"/>
-                  </a:schemeClr>
-                </a:solidFill>
-                <a:latin typeface="+mn-lt"/>
-                <a:hlinkClick r:id="rId3"/>
-              </a:rPr>
-              <a:t>Creative Commons Attribution 4.0 International License</a:t>
-            </a:r>
-            <a:r>
-              <a:rPr kumimoji="0" lang="en-US" sz="1200" b="0" i="1" u="none" strike="noStrike" cap="none" normalizeH="0" baseline="0" dirty="0">
-                <a:ln>
-                  <a:noFill/>
-                </a:ln>
-                <a:solidFill>
-                  <a:schemeClr val="tx2">
-                    <a:lumMod val="20000"/>
-                    <a:lumOff val="80000"/>
-                  </a:schemeClr>
-                </a:solidFill>
-                <a:effectLst/>
-                <a:latin typeface="+mn-lt"/>
-              </a:rPr>
-              <a:t> </a:t>
-            </a:r>
-          </a:p>
-          <a:p>
-            <a:pPr lvl="0" eaLnBrk="0" fontAlgn="base" hangingPunct="0">
-              <a:spcBef>
-                <a:spcPct val="0"/>
-              </a:spcBef>
-              <a:spcAft>
-                <a:spcPct val="0"/>
-              </a:spcAft>
-            </a:pPr>
-            <a:r>
-              <a:rPr kumimoji="0" lang="en-IN" sz="1200" b="0" i="1" u="none" strike="noStrike" cap="none" normalizeH="0" baseline="0" dirty="0">
-                <a:ln>
-                  <a:noFill/>
-                </a:ln>
-                <a:solidFill>
-                  <a:schemeClr val="tx2">
-                    <a:lumMod val="20000"/>
-                    <a:lumOff val="80000"/>
-                  </a:schemeClr>
-                </a:solidFill>
-                <a:effectLst/>
-                <a:latin typeface="+mn-lt"/>
-              </a:rPr>
-              <a:t>Copyright for external content used with attribution is retained by their original authors</a:t>
-            </a:r>
-            <a:endParaRPr kumimoji="0" lang="en-US" sz="1200" b="0" i="1" u="none" strike="noStrike" cap="none" normalizeH="0" baseline="0" dirty="0">
-              <a:ln>
-                <a:noFill/>
-              </a:ln>
-              <a:solidFill>
-                <a:schemeClr val="tx2">
-                  <a:lumMod val="20000"/>
-                  <a:lumOff val="80000"/>
-                </a:schemeClr>
-              </a:solidFill>
-              <a:effectLst/>
-              <a:latin typeface="+mn-lt"/>
-            </a:endParaRPr>
-          </a:p>
-        </p:txBody>
-      </p:sp>
-      <p:pic>
-        <p:nvPicPr>
-          <p:cNvPr id="41" name="Picture 2" descr="Creative Commons License"/>
-          <p:cNvPicPr>
-            <a:picLocks noChangeAspect="1" noChangeArrowheads="1"/>
-          </p:cNvPicPr>
-          <p:nvPr userDrawn="1"/>
-        </p:nvPicPr>
-        <p:blipFill>
-          <a:blip r:embed="rId4">
-            <a:lum bright="70000" contrast="-70000"/>
-            <a:extLst>
-              <a:ext uri="{BEBA8EAE-BF5A-486C-A8C5-ECC9F3942E4B}">
-                <a14:imgProps xmlns:a14="http://schemas.microsoft.com/office/drawing/2010/main">
-                  <a14:imgLayer r:embed="rId5">
-                    <a14:imgEffect>
-                      <a14:colorTemperature colorTemp="8800"/>
-                    </a14:imgEffect>
-                  </a14:imgLayer>
-                </a14:imgProps>
-              </a:ext>
-              <a:ext uri="{28A0092B-C50C-407E-A947-70E740481C1C}">
-                <a14:useLocalDpi xmlns:a14="http://schemas.microsoft.com/office/drawing/2010/main" val="0"/>
-              </a:ext>
-            </a:extLst>
-          </a:blip>
-          <a:srcRect/>
-          <a:stretch>
-            <a:fillRect/>
-          </a:stretch>
-        </p:blipFill>
-        <p:spPr bwMode="auto">
-          <a:xfrm>
-            <a:off x="83464" y="6400051"/>
-            <a:ext cx="838200" cy="295275"/>
-          </a:xfrm>
-          <a:prstGeom prst="rect">
-            <a:avLst/>
-          </a:prstGeom>
-          <a:noFill/>
-          <a:extLst>
-            <a:ext uri="{909E8E84-426E-40DD-AFC4-6F175D3DCCD1}">
-              <a14:hiddenFill xmlns:a14="http://schemas.microsoft.com/office/drawing/2010/main">
-                <a:solidFill>
-                  <a:srgbClr val="FFFFFF"/>
-                </a:solidFill>
-              </a14:hiddenFill>
-            </a:ext>
-          </a:extLst>
-        </p:spPr>
-      </p:pic>
-      <p:grpSp>
-        <p:nvGrpSpPr>
-          <p:cNvPr id="44" name="Group 43"/>
-          <p:cNvGrpSpPr>
-            <a:grpSpLocks noChangeAspect="1"/>
-          </p:cNvGrpSpPr>
-          <p:nvPr userDrawn="1"/>
-        </p:nvGrpSpPr>
-        <p:grpSpPr>
-          <a:xfrm>
-            <a:off x="7254124" y="5901000"/>
-            <a:ext cx="1878078" cy="915514"/>
-            <a:chOff x="3802302" y="177382"/>
-            <a:chExt cx="3192821" cy="1556416"/>
-          </a:xfrm>
-        </p:grpSpPr>
-        <p:sp>
-          <p:nvSpPr>
-            <p:cNvPr id="45" name="object 19"/>
-            <p:cNvSpPr/>
-            <p:nvPr/>
-          </p:nvSpPr>
-          <p:spPr>
-            <a:xfrm>
-              <a:off x="3930990" y="1669208"/>
-              <a:ext cx="2921635" cy="0"/>
-            </a:xfrm>
-            <a:custGeom>
-              <a:avLst/>
-              <a:gdLst/>
-              <a:ahLst/>
-              <a:cxnLst/>
-              <a:rect l="l" t="t" r="r" b="b"/>
-              <a:pathLst>
-                <a:path w="2921634">
-                  <a:moveTo>
-                    <a:pt x="0" y="0"/>
-                  </a:moveTo>
-                  <a:lnTo>
-                    <a:pt x="2921203" y="0"/>
-                  </a:lnTo>
-                </a:path>
-              </a:pathLst>
-            </a:custGeom>
-            <a:ln w="7124">
-              <a:solidFill>
-                <a:srgbClr val="005D9E"/>
-              </a:solidFill>
-            </a:ln>
-          </p:spPr>
-          <p:txBody>
-            <a:bodyPr wrap="square" lIns="0" tIns="0" rIns="0" bIns="0" rtlCol="0"/>
-            <a:lstStyle/>
-            <a:p>
-              <a:endParaRPr/>
-            </a:p>
-          </p:txBody>
-        </p:sp>
-        <p:grpSp>
-          <p:nvGrpSpPr>
-            <p:cNvPr id="46" name="Group 45"/>
-            <p:cNvGrpSpPr>
-              <a:grpSpLocks noChangeAspect="1"/>
-            </p:cNvGrpSpPr>
-            <p:nvPr/>
-          </p:nvGrpSpPr>
-          <p:grpSpPr>
-            <a:xfrm>
-              <a:off x="3927903" y="264369"/>
-              <a:ext cx="1003096" cy="1080000"/>
-              <a:chOff x="598488" y="432211"/>
-              <a:chExt cx="2120668" cy="2283253"/>
-            </a:xfrm>
-          </p:grpSpPr>
-          <p:sp>
-            <p:nvSpPr>
-              <p:cNvPr id="50" name="object 8"/>
-              <p:cNvSpPr/>
-              <p:nvPr/>
-            </p:nvSpPr>
-            <p:spPr>
-              <a:xfrm>
-                <a:off x="1205052" y="2584170"/>
-                <a:ext cx="73660" cy="73025"/>
-              </a:xfrm>
-              <a:custGeom>
-                <a:avLst/>
-                <a:gdLst/>
-                <a:ahLst/>
-                <a:cxnLst/>
-                <a:rect l="l" t="t" r="r" b="b"/>
-                <a:pathLst>
-                  <a:path w="73659" h="73025">
-                    <a:moveTo>
-                      <a:pt x="39627" y="0"/>
-                    </a:moveTo>
-                    <a:lnTo>
-                      <a:pt x="5051" y="17194"/>
-                    </a:lnTo>
-                    <a:lnTo>
-                      <a:pt x="0" y="40554"/>
-                    </a:lnTo>
-                    <a:lnTo>
-                      <a:pt x="3351" y="52202"/>
-                    </a:lnTo>
-                    <a:lnTo>
-                      <a:pt x="10620" y="62446"/>
-                    </a:lnTo>
-                    <a:lnTo>
-                      <a:pt x="17885" y="68116"/>
-                    </a:lnTo>
-                    <a:lnTo>
-                      <a:pt x="29208" y="72513"/>
-                    </a:lnTo>
-                    <a:lnTo>
-                      <a:pt x="41203" y="73008"/>
-                    </a:lnTo>
-                    <a:lnTo>
-                      <a:pt x="52855" y="69591"/>
-                    </a:lnTo>
-                    <a:lnTo>
-                      <a:pt x="63151" y="62251"/>
-                    </a:lnTo>
-                    <a:lnTo>
-                      <a:pt x="69973" y="52632"/>
-                    </a:lnTo>
-                    <a:lnTo>
-                      <a:pt x="73200" y="41606"/>
-                    </a:lnTo>
-                    <a:lnTo>
-                      <a:pt x="72685" y="29895"/>
-                    </a:lnTo>
-                    <a:lnTo>
-                      <a:pt x="68279" y="18223"/>
-                    </a:lnTo>
-                    <a:lnTo>
-                      <a:pt x="59835" y="7312"/>
-                    </a:lnTo>
-                    <a:lnTo>
-                      <a:pt x="50338" y="1961"/>
-                    </a:lnTo>
-                    <a:lnTo>
-                      <a:pt x="39627" y="0"/>
-                    </a:lnTo>
-                    <a:close/>
-                  </a:path>
-                </a:pathLst>
-              </a:custGeom>
-              <a:solidFill>
-                <a:srgbClr val="005D9E"/>
-              </a:solidFill>
-            </p:spPr>
-            <p:txBody>
-              <a:bodyPr wrap="square" lIns="0" tIns="0" rIns="0" bIns="0" rtlCol="0"/>
-              <a:lstStyle/>
-              <a:p>
-                <a:endParaRPr/>
-              </a:p>
-            </p:txBody>
-          </p:sp>
-          <p:sp>
-            <p:nvSpPr>
-              <p:cNvPr id="51" name="bk object 16"/>
-              <p:cNvSpPr/>
-              <p:nvPr/>
-            </p:nvSpPr>
-            <p:spPr>
-              <a:xfrm>
-                <a:off x="1962839" y="577608"/>
-                <a:ext cx="667385" cy="1985010"/>
-              </a:xfrm>
-              <a:custGeom>
-                <a:avLst/>
-                <a:gdLst/>
-                <a:ahLst/>
-                <a:cxnLst/>
-                <a:rect l="l" t="t" r="r" b="b"/>
-                <a:pathLst>
-                  <a:path w="667385" h="1985010">
-                    <a:moveTo>
-                      <a:pt x="0" y="0"/>
-                    </a:moveTo>
-                    <a:lnTo>
-                      <a:pt x="72899" y="55445"/>
-                    </a:lnTo>
-                    <a:lnTo>
-                      <a:pt x="139199" y="113673"/>
-                    </a:lnTo>
-                    <a:lnTo>
-                      <a:pt x="199209" y="174074"/>
-                    </a:lnTo>
-                    <a:lnTo>
-                      <a:pt x="253237" y="236039"/>
-                    </a:lnTo>
-                    <a:lnTo>
-                      <a:pt x="301594" y="298962"/>
-                    </a:lnTo>
-                    <a:lnTo>
-                      <a:pt x="344589" y="362233"/>
-                    </a:lnTo>
-                    <a:lnTo>
-                      <a:pt x="382531" y="425245"/>
-                    </a:lnTo>
-                    <a:lnTo>
-                      <a:pt x="415730" y="487388"/>
-                    </a:lnTo>
-                    <a:lnTo>
-                      <a:pt x="444494" y="548056"/>
-                    </a:lnTo>
-                    <a:lnTo>
-                      <a:pt x="469134" y="606639"/>
-                    </a:lnTo>
-                    <a:lnTo>
-                      <a:pt x="489959" y="662529"/>
-                    </a:lnTo>
-                    <a:lnTo>
-                      <a:pt x="507278" y="715119"/>
-                    </a:lnTo>
-                    <a:lnTo>
-                      <a:pt x="521401" y="763799"/>
-                    </a:lnTo>
-                    <a:lnTo>
-                      <a:pt x="532637" y="807962"/>
-                    </a:lnTo>
-                    <a:lnTo>
-                      <a:pt x="541296" y="847000"/>
-                    </a:lnTo>
-                    <a:lnTo>
-                      <a:pt x="552118" y="907265"/>
-                    </a:lnTo>
-                    <a:lnTo>
-                      <a:pt x="556755" y="944016"/>
-                    </a:lnTo>
-                    <a:lnTo>
-                      <a:pt x="556039" y="1047664"/>
-                    </a:lnTo>
-                    <a:lnTo>
-                      <a:pt x="550684" y="1145660"/>
-                    </a:lnTo>
-                    <a:lnTo>
-                      <a:pt x="541196" y="1238040"/>
-                    </a:lnTo>
-                    <a:lnTo>
-                      <a:pt x="528080" y="1324842"/>
-                    </a:lnTo>
-                    <a:lnTo>
-                      <a:pt x="511842" y="1406101"/>
-                    </a:lnTo>
-                    <a:lnTo>
-                      <a:pt x="492988" y="1481853"/>
-                    </a:lnTo>
-                    <a:lnTo>
-                      <a:pt x="472024" y="1552136"/>
-                    </a:lnTo>
-                    <a:lnTo>
-                      <a:pt x="449453" y="1616986"/>
-                    </a:lnTo>
-                    <a:lnTo>
-                      <a:pt x="425784" y="1676438"/>
-                    </a:lnTo>
-                    <a:lnTo>
-                      <a:pt x="401520" y="1730530"/>
-                    </a:lnTo>
-                    <a:lnTo>
-                      <a:pt x="377167" y="1779298"/>
-                    </a:lnTo>
-                    <a:lnTo>
-                      <a:pt x="353231" y="1822777"/>
-                    </a:lnTo>
-                    <a:lnTo>
-                      <a:pt x="330218" y="1861005"/>
-                    </a:lnTo>
-                    <a:lnTo>
-                      <a:pt x="308633" y="1894018"/>
-                    </a:lnTo>
-                    <a:lnTo>
-                      <a:pt x="271770" y="1944544"/>
-                    </a:lnTo>
-                    <a:lnTo>
-                      <a:pt x="246686" y="1974646"/>
-                    </a:lnTo>
-                    <a:lnTo>
-                      <a:pt x="237426" y="1984616"/>
-                    </a:lnTo>
-                    <a:lnTo>
-                      <a:pt x="299925" y="1940762"/>
-                    </a:lnTo>
-                    <a:lnTo>
-                      <a:pt x="356056" y="1890351"/>
-                    </a:lnTo>
-                    <a:lnTo>
-                      <a:pt x="406161" y="1834335"/>
-                    </a:lnTo>
-                    <a:lnTo>
-                      <a:pt x="450581" y="1773667"/>
-                    </a:lnTo>
-                    <a:lnTo>
-                      <a:pt x="489661" y="1709299"/>
-                    </a:lnTo>
-                    <a:lnTo>
-                      <a:pt x="523740" y="1642183"/>
-                    </a:lnTo>
-                    <a:lnTo>
-                      <a:pt x="553161" y="1573272"/>
-                    </a:lnTo>
-                    <a:lnTo>
-                      <a:pt x="578266" y="1503516"/>
-                    </a:lnTo>
-                    <a:lnTo>
-                      <a:pt x="599398" y="1433869"/>
-                    </a:lnTo>
-                    <a:lnTo>
-                      <a:pt x="616897" y="1365283"/>
-                    </a:lnTo>
-                    <a:lnTo>
-                      <a:pt x="631107" y="1298710"/>
-                    </a:lnTo>
-                    <a:lnTo>
-                      <a:pt x="642369" y="1235101"/>
-                    </a:lnTo>
-                    <a:lnTo>
-                      <a:pt x="651025" y="1175410"/>
-                    </a:lnTo>
-                    <a:lnTo>
-                      <a:pt x="657417" y="1120589"/>
-                    </a:lnTo>
-                    <a:lnTo>
-                      <a:pt x="661888" y="1071589"/>
-                    </a:lnTo>
-                    <a:lnTo>
-                      <a:pt x="664779" y="1029363"/>
-                    </a:lnTo>
-                    <a:lnTo>
-                      <a:pt x="667189" y="969042"/>
-                    </a:lnTo>
-                    <a:lnTo>
-                      <a:pt x="667393" y="952850"/>
-                    </a:lnTo>
-                    <a:lnTo>
-                      <a:pt x="667385" y="947242"/>
-                    </a:lnTo>
-                    <a:lnTo>
-                      <a:pt x="647153" y="834291"/>
-                    </a:lnTo>
-                    <a:lnTo>
-                      <a:pt x="621068" y="730297"/>
-                    </a:lnTo>
-                    <a:lnTo>
-                      <a:pt x="589873" y="634920"/>
-                    </a:lnTo>
-                    <a:lnTo>
-                      <a:pt x="554314" y="547815"/>
-                    </a:lnTo>
-                    <a:lnTo>
-                      <a:pt x="515137" y="468642"/>
-                    </a:lnTo>
-                    <a:lnTo>
-                      <a:pt x="473086" y="397057"/>
-                    </a:lnTo>
-                    <a:lnTo>
-                      <a:pt x="428907" y="332719"/>
-                    </a:lnTo>
-                    <a:lnTo>
-                      <a:pt x="383345" y="275285"/>
-                    </a:lnTo>
-                    <a:lnTo>
-                      <a:pt x="337146" y="224413"/>
-                    </a:lnTo>
-                    <a:lnTo>
-                      <a:pt x="291053" y="179760"/>
-                    </a:lnTo>
-                    <a:lnTo>
-                      <a:pt x="245814" y="140985"/>
-                    </a:lnTo>
-                    <a:lnTo>
-                      <a:pt x="202173" y="107744"/>
-                    </a:lnTo>
-                    <a:lnTo>
-                      <a:pt x="160874" y="79696"/>
-                    </a:lnTo>
-                    <a:lnTo>
-                      <a:pt x="122665" y="56498"/>
-                    </a:lnTo>
-                    <a:lnTo>
-                      <a:pt x="88289" y="37808"/>
-                    </a:lnTo>
-                    <a:lnTo>
-                      <a:pt x="34019" y="12584"/>
-                    </a:lnTo>
-                    <a:lnTo>
-                      <a:pt x="4028" y="1284"/>
-                    </a:lnTo>
-                    <a:lnTo>
-                      <a:pt x="0" y="0"/>
-                    </a:lnTo>
-                    <a:close/>
-                  </a:path>
-                </a:pathLst>
-              </a:custGeom>
-              <a:solidFill>
-                <a:srgbClr val="005D9E"/>
-              </a:solidFill>
-            </p:spPr>
-            <p:txBody>
-              <a:bodyPr wrap="square" lIns="0" tIns="0" rIns="0" bIns="0" rtlCol="0"/>
-              <a:lstStyle/>
-              <a:p>
-                <a:endParaRPr/>
-              </a:p>
-            </p:txBody>
-          </p:sp>
-          <p:sp>
-            <p:nvSpPr>
-              <p:cNvPr id="52" name="bk object 18"/>
-              <p:cNvSpPr/>
-              <p:nvPr/>
-            </p:nvSpPr>
-            <p:spPr>
-              <a:xfrm>
-                <a:off x="798262" y="732992"/>
-                <a:ext cx="1520190" cy="1545590"/>
-              </a:xfrm>
-              <a:custGeom>
-                <a:avLst/>
-                <a:gdLst/>
-                <a:ahLst/>
-                <a:cxnLst/>
-                <a:rect l="l" t="t" r="r" b="b"/>
-                <a:pathLst>
-                  <a:path w="1520189" h="1545589">
-                    <a:moveTo>
-                      <a:pt x="820" y="1503114"/>
-                    </a:moveTo>
-                    <a:lnTo>
-                      <a:pt x="694" y="1505363"/>
-                    </a:lnTo>
-                    <a:lnTo>
-                      <a:pt x="0" y="1534954"/>
-                    </a:lnTo>
-                    <a:lnTo>
-                      <a:pt x="37" y="1545273"/>
-                    </a:lnTo>
-                    <a:lnTo>
-                      <a:pt x="820" y="1503114"/>
-                    </a:lnTo>
-                    <a:close/>
-                  </a:path>
-                  <a:path w="1520189" h="1545589">
-                    <a:moveTo>
-                      <a:pt x="1276047" y="0"/>
-                    </a:moveTo>
-                    <a:lnTo>
-                      <a:pt x="1182981" y="4203"/>
-                    </a:lnTo>
-                    <a:lnTo>
-                      <a:pt x="1080725" y="14886"/>
-                    </a:lnTo>
-                    <a:lnTo>
-                      <a:pt x="971664" y="33811"/>
-                    </a:lnTo>
-                    <a:lnTo>
-                      <a:pt x="858182" y="62739"/>
-                    </a:lnTo>
-                    <a:lnTo>
-                      <a:pt x="742664" y="103434"/>
-                    </a:lnTo>
-                    <a:lnTo>
-                      <a:pt x="627493" y="157658"/>
-                    </a:lnTo>
-                    <a:lnTo>
-                      <a:pt x="515054" y="227173"/>
-                    </a:lnTo>
-                    <a:lnTo>
-                      <a:pt x="407733" y="313741"/>
-                    </a:lnTo>
-                    <a:lnTo>
-                      <a:pt x="307912" y="419126"/>
-                    </a:lnTo>
-                    <a:lnTo>
-                      <a:pt x="217977" y="545089"/>
-                    </a:lnTo>
-                    <a:lnTo>
-                      <a:pt x="140311" y="693394"/>
-                    </a:lnTo>
-                    <a:lnTo>
-                      <a:pt x="77300" y="865802"/>
-                    </a:lnTo>
-                    <a:lnTo>
-                      <a:pt x="31328" y="1064077"/>
-                    </a:lnTo>
-                    <a:lnTo>
-                      <a:pt x="4779" y="1289979"/>
-                    </a:lnTo>
-                    <a:lnTo>
-                      <a:pt x="820" y="1503114"/>
-                    </a:lnTo>
-                    <a:lnTo>
-                      <a:pt x="3332" y="1458550"/>
-                    </a:lnTo>
-                    <a:lnTo>
-                      <a:pt x="9127" y="1396566"/>
-                    </a:lnTo>
-                    <a:lnTo>
-                      <a:pt x="19289" y="1321461"/>
-                    </a:lnTo>
-                    <a:lnTo>
-                      <a:pt x="35032" y="1235286"/>
-                    </a:lnTo>
-                    <a:lnTo>
-                      <a:pt x="57567" y="1140089"/>
-                    </a:lnTo>
-                    <a:lnTo>
-                      <a:pt x="88106" y="1037922"/>
-                    </a:lnTo>
-                    <a:lnTo>
-                      <a:pt x="127862" y="930834"/>
-                    </a:lnTo>
-                    <a:lnTo>
-                      <a:pt x="178045" y="820876"/>
-                    </a:lnTo>
-                    <a:lnTo>
-                      <a:pt x="239869" y="710098"/>
-                    </a:lnTo>
-                    <a:lnTo>
-                      <a:pt x="314545" y="600551"/>
-                    </a:lnTo>
-                    <a:lnTo>
-                      <a:pt x="403286" y="494283"/>
-                    </a:lnTo>
-                    <a:lnTo>
-                      <a:pt x="507302" y="393347"/>
-                    </a:lnTo>
-                    <a:lnTo>
-                      <a:pt x="627807" y="299791"/>
-                    </a:lnTo>
-                    <a:lnTo>
-                      <a:pt x="766012" y="215665"/>
-                    </a:lnTo>
-                    <a:lnTo>
-                      <a:pt x="923129" y="143022"/>
-                    </a:lnTo>
-                    <a:lnTo>
-                      <a:pt x="1100371" y="83909"/>
-                    </a:lnTo>
-                    <a:lnTo>
-                      <a:pt x="1298949" y="40378"/>
-                    </a:lnTo>
-                    <a:lnTo>
-                      <a:pt x="1520075" y="14478"/>
-                    </a:lnTo>
-                    <a:lnTo>
-                      <a:pt x="1508724" y="12724"/>
-                    </a:lnTo>
-                    <a:lnTo>
-                      <a:pt x="1476262" y="8637"/>
-                    </a:lnTo>
-                    <a:lnTo>
-                      <a:pt x="1425072" y="3979"/>
-                    </a:lnTo>
-                    <a:lnTo>
-                      <a:pt x="1357539" y="512"/>
-                    </a:lnTo>
-                    <a:lnTo>
-                      <a:pt x="1276047" y="0"/>
-                    </a:lnTo>
-                    <a:close/>
-                  </a:path>
-                </a:pathLst>
-              </a:custGeom>
-              <a:solidFill>
-                <a:srgbClr val="59CAF4"/>
-              </a:solidFill>
-            </p:spPr>
-            <p:txBody>
-              <a:bodyPr wrap="square" lIns="0" tIns="0" rIns="0" bIns="0" rtlCol="0"/>
-              <a:lstStyle/>
-              <a:p>
-                <a:endParaRPr/>
-              </a:p>
-            </p:txBody>
-          </p:sp>
-          <p:sp>
-            <p:nvSpPr>
-              <p:cNvPr id="53" name="bk object 19"/>
-              <p:cNvSpPr/>
-              <p:nvPr/>
-            </p:nvSpPr>
-            <p:spPr>
-              <a:xfrm>
-                <a:off x="907837" y="1023442"/>
-                <a:ext cx="1642745" cy="328930"/>
-              </a:xfrm>
-              <a:custGeom>
-                <a:avLst/>
-                <a:gdLst/>
-                <a:ahLst/>
-                <a:cxnLst/>
-                <a:rect l="l" t="t" r="r" b="b"/>
-                <a:pathLst>
-                  <a:path w="1642745" h="328930">
-                    <a:moveTo>
-                      <a:pt x="0" y="0"/>
-                    </a:moveTo>
-                    <a:lnTo>
-                      <a:pt x="53279" y="37931"/>
-                    </a:lnTo>
-                    <a:lnTo>
-                      <a:pt x="93011" y="63744"/>
-                    </a:lnTo>
-                    <a:lnTo>
-                      <a:pt x="142663" y="93835"/>
-                    </a:lnTo>
-                    <a:lnTo>
-                      <a:pt x="201595" y="126820"/>
-                    </a:lnTo>
-                    <a:lnTo>
-                      <a:pt x="269165" y="161315"/>
-                    </a:lnTo>
-                    <a:lnTo>
-                      <a:pt x="344734" y="195938"/>
-                    </a:lnTo>
-                    <a:lnTo>
-                      <a:pt x="427662" y="229304"/>
-                    </a:lnTo>
-                    <a:lnTo>
-                      <a:pt x="517309" y="260029"/>
-                    </a:lnTo>
-                    <a:lnTo>
-                      <a:pt x="613034" y="286730"/>
-                    </a:lnTo>
-                    <a:lnTo>
-                      <a:pt x="714197" y="308022"/>
-                    </a:lnTo>
-                    <a:lnTo>
-                      <a:pt x="820159" y="322523"/>
-                    </a:lnTo>
-                    <a:lnTo>
-                      <a:pt x="930278" y="328849"/>
-                    </a:lnTo>
-                    <a:lnTo>
-                      <a:pt x="1043916" y="325615"/>
-                    </a:lnTo>
-                    <a:lnTo>
-                      <a:pt x="1160431" y="311438"/>
-                    </a:lnTo>
-                    <a:lnTo>
-                      <a:pt x="1279183" y="284935"/>
-                    </a:lnTo>
-                    <a:lnTo>
-                      <a:pt x="1399534" y="244721"/>
-                    </a:lnTo>
-                    <a:lnTo>
-                      <a:pt x="1473085" y="211186"/>
-                    </a:lnTo>
-                    <a:lnTo>
-                      <a:pt x="875165" y="211186"/>
-                    </a:lnTo>
-                    <a:lnTo>
-                      <a:pt x="767774" y="207492"/>
-                    </a:lnTo>
-                    <a:lnTo>
-                      <a:pt x="657977" y="198726"/>
-                    </a:lnTo>
-                    <a:lnTo>
-                      <a:pt x="546691" y="184182"/>
-                    </a:lnTo>
-                    <a:lnTo>
-                      <a:pt x="434831" y="163150"/>
-                    </a:lnTo>
-                    <a:lnTo>
-                      <a:pt x="323316" y="134924"/>
-                    </a:lnTo>
-                    <a:lnTo>
-                      <a:pt x="213061" y="98796"/>
-                    </a:lnTo>
-                    <a:lnTo>
-                      <a:pt x="104983" y="54057"/>
-                    </a:lnTo>
-                    <a:lnTo>
-                      <a:pt x="0" y="0"/>
-                    </a:lnTo>
-                    <a:close/>
-                  </a:path>
-                  <a:path w="1642745" h="328930">
-                    <a:moveTo>
-                      <a:pt x="1642465" y="117627"/>
-                    </a:moveTo>
-                    <a:lnTo>
-                      <a:pt x="1582133" y="133030"/>
-                    </a:lnTo>
-                    <a:lnTo>
-                      <a:pt x="1537653" y="143123"/>
-                    </a:lnTo>
-                    <a:lnTo>
-                      <a:pt x="1482515" y="154515"/>
-                    </a:lnTo>
-                    <a:lnTo>
-                      <a:pt x="1417638" y="166499"/>
-                    </a:lnTo>
-                    <a:lnTo>
-                      <a:pt x="1343937" y="178367"/>
-                    </a:lnTo>
-                    <a:lnTo>
-                      <a:pt x="1262303" y="189413"/>
-                    </a:lnTo>
-                    <a:lnTo>
-                      <a:pt x="1173731" y="198922"/>
-                    </a:lnTo>
-                    <a:lnTo>
-                      <a:pt x="1079060" y="206194"/>
-                    </a:lnTo>
-                    <a:lnTo>
-                      <a:pt x="979232" y="210518"/>
-                    </a:lnTo>
-                    <a:lnTo>
-                      <a:pt x="875165" y="211186"/>
-                    </a:lnTo>
-                    <a:lnTo>
-                      <a:pt x="1473085" y="211186"/>
-                    </a:lnTo>
-                    <a:lnTo>
-                      <a:pt x="1520846" y="189410"/>
-                    </a:lnTo>
-                    <a:lnTo>
-                      <a:pt x="1642465" y="117627"/>
-                    </a:lnTo>
-                    <a:close/>
-                  </a:path>
-                </a:pathLst>
-              </a:custGeom>
-              <a:solidFill>
-                <a:srgbClr val="F98512"/>
-              </a:solidFill>
-            </p:spPr>
-            <p:txBody>
-              <a:bodyPr wrap="square" lIns="0" tIns="0" rIns="0" bIns="0" rtlCol="0"/>
-              <a:lstStyle/>
-              <a:p>
-                <a:endParaRPr/>
-              </a:p>
-            </p:txBody>
-          </p:sp>
-          <p:sp>
-            <p:nvSpPr>
-              <p:cNvPr id="54" name="bk object 20"/>
-              <p:cNvSpPr/>
-              <p:nvPr/>
-            </p:nvSpPr>
-            <p:spPr>
-              <a:xfrm>
-                <a:off x="700370" y="1230909"/>
-                <a:ext cx="1769110" cy="1014730"/>
-              </a:xfrm>
-              <a:custGeom>
-                <a:avLst/>
-                <a:gdLst/>
-                <a:ahLst/>
-                <a:cxnLst/>
-                <a:rect l="l" t="t" r="r" b="b"/>
-                <a:pathLst>
-                  <a:path w="1769110" h="1014730">
-                    <a:moveTo>
-                      <a:pt x="0" y="0"/>
-                    </a:moveTo>
-                    <a:lnTo>
-                      <a:pt x="78777" y="210379"/>
-                    </a:lnTo>
-                    <a:lnTo>
-                      <a:pt x="167918" y="390957"/>
-                    </a:lnTo>
-                    <a:lnTo>
-                      <a:pt x="265866" y="543789"/>
-                    </a:lnTo>
-                    <a:lnTo>
-                      <a:pt x="371062" y="670932"/>
-                    </a:lnTo>
-                    <a:lnTo>
-                      <a:pt x="481951" y="774441"/>
-                    </a:lnTo>
-                    <a:lnTo>
-                      <a:pt x="596973" y="856373"/>
-                    </a:lnTo>
-                    <a:lnTo>
-                      <a:pt x="714571" y="918782"/>
-                    </a:lnTo>
-                    <a:lnTo>
-                      <a:pt x="833189" y="963726"/>
-                    </a:lnTo>
-                    <a:lnTo>
-                      <a:pt x="951268" y="993259"/>
-                    </a:lnTo>
-                    <a:lnTo>
-                      <a:pt x="1067250" y="1009438"/>
-                    </a:lnTo>
-                    <a:lnTo>
-                      <a:pt x="1179579" y="1014319"/>
-                    </a:lnTo>
-                    <a:lnTo>
-                      <a:pt x="1286697" y="1009958"/>
-                    </a:lnTo>
-                    <a:lnTo>
-                      <a:pt x="1387045" y="998410"/>
-                    </a:lnTo>
-                    <a:lnTo>
-                      <a:pt x="1479067" y="981732"/>
-                    </a:lnTo>
-                    <a:lnTo>
-                      <a:pt x="1530685" y="969318"/>
-                    </a:lnTo>
-                    <a:lnTo>
-                      <a:pt x="1301323" y="969318"/>
-                    </a:lnTo>
-                    <a:lnTo>
-                      <a:pt x="1159559" y="955183"/>
-                    </a:lnTo>
-                    <a:lnTo>
-                      <a:pt x="1025147" y="924372"/>
-                    </a:lnTo>
-                    <a:lnTo>
-                      <a:pt x="898247" y="879150"/>
-                    </a:lnTo>
-                    <a:lnTo>
-                      <a:pt x="779018" y="821779"/>
-                    </a:lnTo>
-                    <a:lnTo>
-                      <a:pt x="667620" y="754522"/>
-                    </a:lnTo>
-                    <a:lnTo>
-                      <a:pt x="564215" y="679642"/>
-                    </a:lnTo>
-                    <a:lnTo>
-                      <a:pt x="468961" y="599401"/>
-                    </a:lnTo>
-                    <a:lnTo>
-                      <a:pt x="382020" y="516063"/>
-                    </a:lnTo>
-                    <a:lnTo>
-                      <a:pt x="303550" y="431891"/>
-                    </a:lnTo>
-                    <a:lnTo>
-                      <a:pt x="233713" y="349146"/>
-                    </a:lnTo>
-                    <a:lnTo>
-                      <a:pt x="172668" y="270092"/>
-                    </a:lnTo>
-                    <a:lnTo>
-                      <a:pt x="120575" y="196992"/>
-                    </a:lnTo>
-                    <a:lnTo>
-                      <a:pt x="77595" y="132109"/>
-                    </a:lnTo>
-                    <a:lnTo>
-                      <a:pt x="43887" y="77705"/>
-                    </a:lnTo>
-                    <a:lnTo>
-                      <a:pt x="19612" y="36044"/>
-                    </a:lnTo>
-                    <a:lnTo>
-                      <a:pt x="4929" y="9388"/>
-                    </a:lnTo>
-                    <a:lnTo>
-                      <a:pt x="0" y="0"/>
-                    </a:lnTo>
-                    <a:close/>
-                  </a:path>
-                  <a:path w="1769110" h="1014730">
-                    <a:moveTo>
-                      <a:pt x="1769122" y="889050"/>
-                    </a:moveTo>
-                    <a:lnTo>
-                      <a:pt x="1606265" y="938515"/>
-                    </a:lnTo>
-                    <a:lnTo>
-                      <a:pt x="1450278" y="964517"/>
-                    </a:lnTo>
-                    <a:lnTo>
-                      <a:pt x="1301323" y="969318"/>
-                    </a:lnTo>
-                    <a:lnTo>
-                      <a:pt x="1530685" y="969318"/>
-                    </a:lnTo>
-                    <a:lnTo>
-                      <a:pt x="1631902" y="941207"/>
-                    </a:lnTo>
-                    <a:lnTo>
-                      <a:pt x="1689599" y="921472"/>
-                    </a:lnTo>
-                    <a:lnTo>
-                      <a:pt x="1732740" y="904831"/>
-                    </a:lnTo>
-                    <a:lnTo>
-                      <a:pt x="1759767" y="893338"/>
-                    </a:lnTo>
-                    <a:lnTo>
-                      <a:pt x="1769122" y="889050"/>
-                    </a:lnTo>
-                    <a:close/>
-                  </a:path>
-                </a:pathLst>
-              </a:custGeom>
-              <a:solidFill>
-                <a:srgbClr val="F98512"/>
-              </a:solidFill>
-            </p:spPr>
-            <p:txBody>
-              <a:bodyPr wrap="square" lIns="0" tIns="0" rIns="0" bIns="0" rtlCol="0"/>
-              <a:lstStyle/>
-              <a:p>
-                <a:endParaRPr/>
-              </a:p>
-            </p:txBody>
-          </p:sp>
-          <p:sp>
-            <p:nvSpPr>
-              <p:cNvPr id="55" name="bk object 21"/>
-              <p:cNvSpPr/>
-              <p:nvPr/>
-            </p:nvSpPr>
-            <p:spPr>
-              <a:xfrm>
-                <a:off x="1073039" y="1185621"/>
-                <a:ext cx="1584960" cy="1365250"/>
-              </a:xfrm>
-              <a:custGeom>
-                <a:avLst/>
-                <a:gdLst/>
-                <a:ahLst/>
-                <a:cxnLst/>
-                <a:rect l="l" t="t" r="r" b="b"/>
-                <a:pathLst>
-                  <a:path w="1584960" h="1365250">
-                    <a:moveTo>
-                      <a:pt x="1584629" y="0"/>
-                    </a:moveTo>
-                    <a:lnTo>
-                      <a:pt x="1576998" y="38164"/>
-                    </a:lnTo>
-                    <a:lnTo>
-                      <a:pt x="1566433" y="82778"/>
-                    </a:lnTo>
-                    <a:lnTo>
-                      <a:pt x="1550454" y="141664"/>
-                    </a:lnTo>
-                    <a:lnTo>
-                      <a:pt x="1528378" y="212762"/>
-                    </a:lnTo>
-                    <a:lnTo>
-                      <a:pt x="1499520" y="294010"/>
-                    </a:lnTo>
-                    <a:lnTo>
-                      <a:pt x="1463195" y="383346"/>
-                    </a:lnTo>
-                    <a:lnTo>
-                      <a:pt x="1418719" y="478711"/>
-                    </a:lnTo>
-                    <a:lnTo>
-                      <a:pt x="1365406" y="578041"/>
-                    </a:lnTo>
-                    <a:lnTo>
-                      <a:pt x="1302573" y="679276"/>
-                    </a:lnTo>
-                    <a:lnTo>
-                      <a:pt x="1229535" y="780356"/>
-                    </a:lnTo>
-                    <a:lnTo>
-                      <a:pt x="1145608" y="879217"/>
-                    </a:lnTo>
-                    <a:lnTo>
-                      <a:pt x="1050105" y="973800"/>
-                    </a:lnTo>
-                    <a:lnTo>
-                      <a:pt x="942344" y="1062042"/>
-                    </a:lnTo>
-                    <a:lnTo>
-                      <a:pt x="821639" y="1141883"/>
-                    </a:lnTo>
-                    <a:lnTo>
-                      <a:pt x="687306" y="1211262"/>
-                    </a:lnTo>
-                    <a:lnTo>
-                      <a:pt x="538660" y="1268116"/>
-                    </a:lnTo>
-                    <a:lnTo>
-                      <a:pt x="375017" y="1310385"/>
-                    </a:lnTo>
-                    <a:lnTo>
-                      <a:pt x="195692" y="1336008"/>
-                    </a:lnTo>
-                    <a:lnTo>
-                      <a:pt x="0" y="1342923"/>
-                    </a:lnTo>
-                    <a:lnTo>
-                      <a:pt x="10172" y="1344938"/>
-                    </a:lnTo>
-                    <a:lnTo>
-                      <a:pt x="39381" y="1349852"/>
-                    </a:lnTo>
-                    <a:lnTo>
-                      <a:pt x="85666" y="1355970"/>
-                    </a:lnTo>
-                    <a:lnTo>
-                      <a:pt x="147065" y="1361593"/>
-                    </a:lnTo>
-                    <a:lnTo>
-                      <a:pt x="221618" y="1365025"/>
-                    </a:lnTo>
-                    <a:lnTo>
-                      <a:pt x="307362" y="1364571"/>
-                    </a:lnTo>
-                    <a:lnTo>
-                      <a:pt x="402338" y="1358533"/>
-                    </a:lnTo>
-                    <a:lnTo>
-                      <a:pt x="504582" y="1345215"/>
-                    </a:lnTo>
-                    <a:lnTo>
-                      <a:pt x="612135" y="1322921"/>
-                    </a:lnTo>
-                    <a:lnTo>
-                      <a:pt x="723034" y="1289953"/>
-                    </a:lnTo>
-                    <a:lnTo>
-                      <a:pt x="835319" y="1244615"/>
-                    </a:lnTo>
-                    <a:lnTo>
-                      <a:pt x="947029" y="1185211"/>
-                    </a:lnTo>
-                    <a:lnTo>
-                      <a:pt x="1056202" y="1110044"/>
-                    </a:lnTo>
-                    <a:lnTo>
-                      <a:pt x="1160876" y="1017417"/>
-                    </a:lnTo>
-                    <a:lnTo>
-                      <a:pt x="1259091" y="905634"/>
-                    </a:lnTo>
-                    <a:lnTo>
-                      <a:pt x="1348885" y="772999"/>
-                    </a:lnTo>
-                    <a:lnTo>
-                      <a:pt x="1428297" y="617814"/>
-                    </a:lnTo>
-                    <a:lnTo>
-                      <a:pt x="1495366" y="438384"/>
-                    </a:lnTo>
-                    <a:lnTo>
-                      <a:pt x="1548131" y="233011"/>
-                    </a:lnTo>
-                    <a:lnTo>
-                      <a:pt x="1584629" y="0"/>
-                    </a:lnTo>
-                    <a:close/>
-                  </a:path>
-                </a:pathLst>
-              </a:custGeom>
-              <a:solidFill>
-                <a:srgbClr val="59CAF4"/>
-              </a:solidFill>
-            </p:spPr>
-            <p:txBody>
-              <a:bodyPr wrap="square" lIns="0" tIns="0" rIns="0" bIns="0" rtlCol="0"/>
-              <a:lstStyle/>
-              <a:p>
-                <a:endParaRPr/>
-              </a:p>
-            </p:txBody>
-          </p:sp>
-          <p:sp>
-            <p:nvSpPr>
-              <p:cNvPr id="56" name="object 6"/>
-              <p:cNvSpPr/>
-              <p:nvPr/>
-            </p:nvSpPr>
-            <p:spPr>
-              <a:xfrm>
-                <a:off x="1120242" y="676770"/>
-                <a:ext cx="903605" cy="1850389"/>
-              </a:xfrm>
-              <a:custGeom>
-                <a:avLst/>
-                <a:gdLst/>
-                <a:ahLst/>
-                <a:cxnLst/>
-                <a:rect l="l" t="t" r="r" b="b"/>
-                <a:pathLst>
-                  <a:path w="903605" h="1850389">
-                    <a:moveTo>
-                      <a:pt x="7521" y="0"/>
-                    </a:moveTo>
-                    <a:lnTo>
-                      <a:pt x="6543" y="9885"/>
-                    </a:lnTo>
-                    <a:lnTo>
-                      <a:pt x="4286" y="38436"/>
-                    </a:lnTo>
-                    <a:lnTo>
-                      <a:pt x="1766" y="83990"/>
-                    </a:lnTo>
-                    <a:lnTo>
-                      <a:pt x="0" y="144886"/>
-                    </a:lnTo>
-                    <a:lnTo>
-                      <a:pt x="2" y="219464"/>
-                    </a:lnTo>
-                    <a:lnTo>
-                      <a:pt x="2791" y="306062"/>
-                    </a:lnTo>
-                    <a:lnTo>
-                      <a:pt x="9381" y="403020"/>
-                    </a:lnTo>
-                    <a:lnTo>
-                      <a:pt x="20789" y="508676"/>
-                    </a:lnTo>
-                    <a:lnTo>
-                      <a:pt x="38030" y="621369"/>
-                    </a:lnTo>
-                    <a:lnTo>
-                      <a:pt x="62121" y="739438"/>
-                    </a:lnTo>
-                    <a:lnTo>
-                      <a:pt x="94079" y="861222"/>
-                    </a:lnTo>
-                    <a:lnTo>
-                      <a:pt x="134918" y="985061"/>
-                    </a:lnTo>
-                    <a:lnTo>
-                      <a:pt x="185655" y="1109292"/>
-                    </a:lnTo>
-                    <a:lnTo>
-                      <a:pt x="247307" y="1232256"/>
-                    </a:lnTo>
-                    <a:lnTo>
-                      <a:pt x="320889" y="1352290"/>
-                    </a:lnTo>
-                    <a:lnTo>
-                      <a:pt x="407417" y="1467734"/>
-                    </a:lnTo>
-                    <a:lnTo>
-                      <a:pt x="507908" y="1576927"/>
-                    </a:lnTo>
-                    <a:lnTo>
-                      <a:pt x="623377" y="1678208"/>
-                    </a:lnTo>
-                    <a:lnTo>
-                      <a:pt x="754841" y="1769916"/>
-                    </a:lnTo>
-                    <a:lnTo>
-                      <a:pt x="903315" y="1850389"/>
-                    </a:lnTo>
-                    <a:lnTo>
-                      <a:pt x="897172" y="1846425"/>
-                    </a:lnTo>
-                    <a:lnTo>
-                      <a:pt x="879563" y="1834390"/>
-                    </a:lnTo>
-                    <a:lnTo>
-                      <a:pt x="814882" y="1785280"/>
-                    </a:lnTo>
-                    <a:lnTo>
-                      <a:pt x="770275" y="1747786"/>
-                    </a:lnTo>
-                    <a:lnTo>
-                      <a:pt x="719134" y="1701388"/>
-                    </a:lnTo>
-                    <a:lnTo>
-                      <a:pt x="662693" y="1645877"/>
-                    </a:lnTo>
-                    <a:lnTo>
-                      <a:pt x="602184" y="1581045"/>
-                    </a:lnTo>
-                    <a:lnTo>
-                      <a:pt x="538839" y="1506682"/>
-                    </a:lnTo>
-                    <a:lnTo>
-                      <a:pt x="473892" y="1422580"/>
-                    </a:lnTo>
-                    <a:lnTo>
-                      <a:pt x="408575" y="1328531"/>
-                    </a:lnTo>
-                    <a:lnTo>
-                      <a:pt x="344122" y="1224325"/>
-                    </a:lnTo>
-                    <a:lnTo>
-                      <a:pt x="281765" y="1109754"/>
-                    </a:lnTo>
-                    <a:lnTo>
-                      <a:pt x="222738" y="984610"/>
-                    </a:lnTo>
-                    <a:lnTo>
-                      <a:pt x="168272" y="848682"/>
-                    </a:lnTo>
-                    <a:lnTo>
-                      <a:pt x="119601" y="701763"/>
-                    </a:lnTo>
-                    <a:lnTo>
-                      <a:pt x="77957" y="543644"/>
-                    </a:lnTo>
-                    <a:lnTo>
-                      <a:pt x="44574" y="374117"/>
-                    </a:lnTo>
-                    <a:lnTo>
-                      <a:pt x="20684" y="192971"/>
-                    </a:lnTo>
-                    <a:lnTo>
-                      <a:pt x="7521" y="0"/>
-                    </a:lnTo>
-                    <a:close/>
-                  </a:path>
-                </a:pathLst>
-              </a:custGeom>
-              <a:solidFill>
-                <a:srgbClr val="005D9E"/>
-              </a:solidFill>
-            </p:spPr>
-            <p:txBody>
-              <a:bodyPr wrap="square" lIns="0" tIns="0" rIns="0" bIns="0" rtlCol="0"/>
-              <a:lstStyle/>
-              <a:p>
-                <a:endParaRPr/>
-              </a:p>
-            </p:txBody>
-          </p:sp>
-          <p:sp>
-            <p:nvSpPr>
-              <p:cNvPr id="57" name="object 3"/>
-              <p:cNvSpPr/>
-              <p:nvPr/>
-            </p:nvSpPr>
-            <p:spPr>
-              <a:xfrm>
-                <a:off x="1261659" y="548589"/>
-                <a:ext cx="688975" cy="2056764"/>
-              </a:xfrm>
-              <a:custGeom>
-                <a:avLst/>
-                <a:gdLst/>
-                <a:ahLst/>
-                <a:cxnLst/>
-                <a:rect l="l" t="t" r="r" b="b"/>
-                <a:pathLst>
-                  <a:path w="688975" h="2056764">
-                    <a:moveTo>
-                      <a:pt x="449211" y="0"/>
-                    </a:moveTo>
-                    <a:lnTo>
-                      <a:pt x="473981" y="68522"/>
-                    </a:lnTo>
-                    <a:lnTo>
-                      <a:pt x="489599" y="119491"/>
-                    </a:lnTo>
-                    <a:lnTo>
-                      <a:pt x="506618" y="183068"/>
-                    </a:lnTo>
-                    <a:lnTo>
-                      <a:pt x="523671" y="258381"/>
-                    </a:lnTo>
-                    <a:lnTo>
-                      <a:pt x="539389" y="344558"/>
-                    </a:lnTo>
-                    <a:lnTo>
-                      <a:pt x="552406" y="440725"/>
-                    </a:lnTo>
-                    <a:lnTo>
-                      <a:pt x="561353" y="546010"/>
-                    </a:lnTo>
-                    <a:lnTo>
-                      <a:pt x="564862" y="659541"/>
-                    </a:lnTo>
-                    <a:lnTo>
-                      <a:pt x="561566" y="780443"/>
-                    </a:lnTo>
-                    <a:lnTo>
-                      <a:pt x="550098" y="907845"/>
-                    </a:lnTo>
-                    <a:lnTo>
-                      <a:pt x="529089" y="1040874"/>
-                    </a:lnTo>
-                    <a:lnTo>
-                      <a:pt x="497171" y="1178656"/>
-                    </a:lnTo>
-                    <a:lnTo>
-                      <a:pt x="452978" y="1320320"/>
-                    </a:lnTo>
-                    <a:lnTo>
-                      <a:pt x="395140" y="1464992"/>
-                    </a:lnTo>
-                    <a:lnTo>
-                      <a:pt x="322292" y="1611799"/>
-                    </a:lnTo>
-                    <a:lnTo>
-                      <a:pt x="233064" y="1759870"/>
-                    </a:lnTo>
-                    <a:lnTo>
-                      <a:pt x="126089" y="1908330"/>
-                    </a:lnTo>
-                    <a:lnTo>
-                      <a:pt x="0" y="2056307"/>
-                    </a:lnTo>
-                    <a:lnTo>
-                      <a:pt x="8485" y="2049380"/>
-                    </a:lnTo>
-                    <a:lnTo>
-                      <a:pt x="69398" y="1995651"/>
-                    </a:lnTo>
-                    <a:lnTo>
-                      <a:pt x="117174" y="1949979"/>
-                    </a:lnTo>
-                    <a:lnTo>
-                      <a:pt x="173396" y="1892520"/>
-                    </a:lnTo>
-                    <a:lnTo>
-                      <a:pt x="235740" y="1823839"/>
-                    </a:lnTo>
-                    <a:lnTo>
-                      <a:pt x="301880" y="1744501"/>
-                    </a:lnTo>
-                    <a:lnTo>
-                      <a:pt x="369491" y="1655069"/>
-                    </a:lnTo>
-                    <a:lnTo>
-                      <a:pt x="436248" y="1556108"/>
-                    </a:lnTo>
-                    <a:lnTo>
-                      <a:pt x="499825" y="1448182"/>
-                    </a:lnTo>
-                    <a:lnTo>
-                      <a:pt x="557899" y="1331856"/>
-                    </a:lnTo>
-                    <a:lnTo>
-                      <a:pt x="608142" y="1207693"/>
-                    </a:lnTo>
-                    <a:lnTo>
-                      <a:pt x="648231" y="1076258"/>
-                    </a:lnTo>
-                    <a:lnTo>
-                      <a:pt x="675840" y="938116"/>
-                    </a:lnTo>
-                    <a:lnTo>
-                      <a:pt x="688644" y="793830"/>
-                    </a:lnTo>
-                    <a:lnTo>
-                      <a:pt x="684319" y="643965"/>
-                    </a:lnTo>
-                    <a:lnTo>
-                      <a:pt x="660537" y="489085"/>
-                    </a:lnTo>
-                    <a:lnTo>
-                      <a:pt x="614976" y="329755"/>
-                    </a:lnTo>
-                    <a:lnTo>
-                      <a:pt x="545309" y="166538"/>
-                    </a:lnTo>
-                    <a:lnTo>
-                      <a:pt x="449211" y="0"/>
-                    </a:lnTo>
-                    <a:close/>
-                  </a:path>
-                </a:pathLst>
-              </a:custGeom>
-              <a:solidFill>
-                <a:srgbClr val="005D9E"/>
-              </a:solidFill>
-            </p:spPr>
-            <p:txBody>
-              <a:bodyPr wrap="square" lIns="0" tIns="0" rIns="0" bIns="0" rtlCol="0"/>
-              <a:lstStyle/>
-              <a:p>
-                <a:endParaRPr/>
-              </a:p>
-            </p:txBody>
-          </p:sp>
-          <p:sp>
-            <p:nvSpPr>
-              <p:cNvPr id="58" name="bk object 17"/>
-              <p:cNvSpPr/>
-              <p:nvPr/>
-            </p:nvSpPr>
-            <p:spPr>
-              <a:xfrm>
-                <a:off x="2291458" y="694662"/>
-                <a:ext cx="90805" cy="90170"/>
-              </a:xfrm>
-              <a:prstGeom prst="ellipse">
-                <a:avLst/>
-              </a:prstGeom>
-              <a:solidFill>
-                <a:srgbClr val="59CAF4"/>
-              </a:solidFill>
-            </p:spPr>
-            <p:txBody>
-              <a:bodyPr wrap="square" lIns="0" tIns="0" rIns="0" bIns="0" rtlCol="0"/>
-              <a:lstStyle/>
-              <a:p>
-                <a:endParaRPr/>
-              </a:p>
-            </p:txBody>
-          </p:sp>
-          <p:sp>
-            <p:nvSpPr>
-              <p:cNvPr id="59" name="object 9"/>
-              <p:cNvSpPr/>
-              <p:nvPr/>
-            </p:nvSpPr>
-            <p:spPr>
-              <a:xfrm>
-                <a:off x="772465" y="2174830"/>
-                <a:ext cx="405130" cy="405130"/>
-              </a:xfrm>
-              <a:prstGeom prst="ellipse">
-                <a:avLst/>
-              </a:prstGeom>
-              <a:solidFill>
-                <a:srgbClr val="59CAF4"/>
-              </a:solidFill>
-            </p:spPr>
-            <p:txBody>
-              <a:bodyPr wrap="square" lIns="0" tIns="0" rIns="0" bIns="0" rtlCol="0"/>
-              <a:lstStyle/>
-              <a:p>
-                <a:endParaRPr/>
-              </a:p>
-            </p:txBody>
-          </p:sp>
-          <p:sp>
-            <p:nvSpPr>
-              <p:cNvPr id="60" name="object 10"/>
-              <p:cNvSpPr/>
-              <p:nvPr/>
-            </p:nvSpPr>
-            <p:spPr>
-              <a:xfrm>
-                <a:off x="1983695" y="2452574"/>
-                <a:ext cx="263525" cy="262890"/>
-              </a:xfrm>
-              <a:prstGeom prst="ellipse">
-                <a:avLst/>
-              </a:prstGeom>
-              <a:solidFill>
-                <a:srgbClr val="005D9E"/>
-              </a:solidFill>
-            </p:spPr>
-            <p:txBody>
-              <a:bodyPr wrap="square" lIns="0" tIns="0" rIns="0" bIns="0" rtlCol="0"/>
-              <a:lstStyle/>
-              <a:p>
-                <a:endParaRPr/>
-              </a:p>
-            </p:txBody>
-          </p:sp>
-          <p:sp>
-            <p:nvSpPr>
-              <p:cNvPr id="61" name="object 11"/>
-              <p:cNvSpPr/>
-              <p:nvPr/>
-            </p:nvSpPr>
-            <p:spPr>
-              <a:xfrm>
-                <a:off x="1565130" y="432211"/>
-                <a:ext cx="194310" cy="194310"/>
-              </a:xfrm>
-              <a:prstGeom prst="ellipse">
-                <a:avLst/>
-              </a:prstGeom>
-              <a:solidFill>
-                <a:srgbClr val="005D9E"/>
-              </a:solidFill>
-            </p:spPr>
-            <p:txBody>
-              <a:bodyPr wrap="square" lIns="0" tIns="0" rIns="0" bIns="0" rtlCol="0"/>
-              <a:lstStyle/>
-              <a:p>
-                <a:endParaRPr/>
-              </a:p>
-            </p:txBody>
-          </p:sp>
-          <p:sp>
-            <p:nvSpPr>
-              <p:cNvPr id="62" name="object 15"/>
-              <p:cNvSpPr/>
-              <p:nvPr/>
-            </p:nvSpPr>
-            <p:spPr>
-              <a:xfrm>
-                <a:off x="598488" y="922194"/>
-                <a:ext cx="349885" cy="349885"/>
-              </a:xfrm>
-              <a:prstGeom prst="ellipse">
-                <a:avLst/>
-              </a:prstGeom>
-              <a:solidFill>
-                <a:srgbClr val="005D9E"/>
-              </a:solidFill>
-            </p:spPr>
-            <p:txBody>
-              <a:bodyPr wrap="square" lIns="0" tIns="0" rIns="0" bIns="0" rtlCol="0"/>
-              <a:lstStyle/>
-              <a:p>
-                <a:endParaRPr/>
-              </a:p>
-            </p:txBody>
-          </p:sp>
-          <p:sp>
-            <p:nvSpPr>
-              <p:cNvPr id="63" name="object 16"/>
-              <p:cNvSpPr/>
-              <p:nvPr/>
-            </p:nvSpPr>
-            <p:spPr>
-              <a:xfrm>
-                <a:off x="2439509" y="2004129"/>
-                <a:ext cx="216535" cy="215900"/>
-              </a:xfrm>
-              <a:prstGeom prst="ellipse">
-                <a:avLst/>
-              </a:prstGeom>
-              <a:solidFill>
-                <a:srgbClr val="59CAF4"/>
-              </a:solidFill>
-            </p:spPr>
-            <p:txBody>
-              <a:bodyPr wrap="square" lIns="0" tIns="0" rIns="0" bIns="0" rtlCol="0"/>
-              <a:lstStyle/>
-              <a:p>
-                <a:endParaRPr/>
-              </a:p>
-            </p:txBody>
-          </p:sp>
-          <p:sp>
-            <p:nvSpPr>
-              <p:cNvPr id="64" name="object 12"/>
-              <p:cNvSpPr/>
-              <p:nvPr/>
-            </p:nvSpPr>
-            <p:spPr>
-              <a:xfrm>
-                <a:off x="1694618" y="1126556"/>
-                <a:ext cx="411480" cy="411480"/>
-              </a:xfrm>
-              <a:prstGeom prst="ellipse">
-                <a:avLst/>
-              </a:prstGeom>
-              <a:solidFill>
-                <a:srgbClr val="59CAF4"/>
-              </a:solidFill>
-            </p:spPr>
-            <p:txBody>
-              <a:bodyPr wrap="square" lIns="0" tIns="0" rIns="0" bIns="0" rtlCol="0"/>
-              <a:lstStyle/>
-              <a:p>
-                <a:endParaRPr/>
-              </a:p>
-            </p:txBody>
-          </p:sp>
-          <p:sp>
-            <p:nvSpPr>
-              <p:cNvPr id="65" name="object 7"/>
-              <p:cNvSpPr/>
-              <p:nvPr/>
-            </p:nvSpPr>
-            <p:spPr>
-              <a:xfrm>
-                <a:off x="1095003" y="657286"/>
-                <a:ext cx="73660" cy="73025"/>
-              </a:xfrm>
-              <a:prstGeom prst="ellipse">
-                <a:avLst/>
-              </a:prstGeom>
-              <a:solidFill>
-                <a:srgbClr val="59CAF4"/>
-              </a:solidFill>
-            </p:spPr>
-            <p:txBody>
-              <a:bodyPr wrap="square" lIns="0" tIns="0" rIns="0" bIns="0" rtlCol="0"/>
-              <a:lstStyle/>
-              <a:p>
-                <a:endParaRPr/>
-              </a:p>
-            </p:txBody>
-          </p:sp>
-          <p:sp>
-            <p:nvSpPr>
-              <p:cNvPr id="66" name="object 13"/>
-              <p:cNvSpPr/>
-              <p:nvPr/>
-            </p:nvSpPr>
-            <p:spPr>
-              <a:xfrm>
-                <a:off x="2502621" y="1005472"/>
-                <a:ext cx="216535" cy="215900"/>
-              </a:xfrm>
-              <a:prstGeom prst="ellipse">
-                <a:avLst/>
-              </a:prstGeom>
-              <a:solidFill>
-                <a:srgbClr val="F98512"/>
-              </a:solidFill>
-            </p:spPr>
-            <p:txBody>
-              <a:bodyPr wrap="square" lIns="0" tIns="0" rIns="0" bIns="0" rtlCol="0"/>
-              <a:lstStyle/>
-              <a:p>
-                <a:endParaRPr/>
-              </a:p>
-            </p:txBody>
-          </p:sp>
-          <p:sp>
-            <p:nvSpPr>
-              <p:cNvPr id="67" name="object 14"/>
-              <p:cNvSpPr/>
-              <p:nvPr/>
-            </p:nvSpPr>
-            <p:spPr>
-              <a:xfrm>
-                <a:off x="1861260" y="481948"/>
-                <a:ext cx="129539" cy="128905"/>
-              </a:xfrm>
-              <a:prstGeom prst="ellipse">
-                <a:avLst/>
-              </a:prstGeom>
-              <a:solidFill>
-                <a:srgbClr val="F98512"/>
-              </a:solidFill>
-            </p:spPr>
-            <p:txBody>
-              <a:bodyPr wrap="square" lIns="0" tIns="0" rIns="0" bIns="0" rtlCol="0"/>
-              <a:lstStyle/>
-              <a:p>
-                <a:endParaRPr/>
-              </a:p>
-            </p:txBody>
-          </p:sp>
-        </p:grpSp>
-        <p:sp>
-          <p:nvSpPr>
-            <p:cNvPr id="47" name="Rectangle 46"/>
-            <p:cNvSpPr/>
-            <p:nvPr/>
-          </p:nvSpPr>
-          <p:spPr>
-            <a:xfrm>
-              <a:off x="4933088" y="177382"/>
-              <a:ext cx="2038980" cy="1308084"/>
-            </a:xfrm>
-            <a:prstGeom prst="rect">
-              <a:avLst/>
-            </a:prstGeom>
-          </p:spPr>
-          <p:txBody>
-            <a:bodyPr wrap="none">
-              <a:spAutoFit/>
-            </a:bodyPr>
-            <a:lstStyle/>
-            <a:p>
-              <a:r>
-                <a:rPr lang="en-US" sz="4400" b="0" i="0" u="none" strike="noStrike" baseline="0" dirty="0">
-                  <a:solidFill>
-                    <a:srgbClr val="005E9F"/>
-                  </a:solidFill>
-                  <a:latin typeface="Cousine" panose="02070409020205020404" pitchFamily="49" charset="0"/>
-                </a:rPr>
-                <a:t>CDS</a:t>
-              </a:r>
-              <a:endParaRPr lang="en-US" sz="1000" dirty="0"/>
-            </a:p>
-          </p:txBody>
-        </p:sp>
-        <p:sp>
-          <p:nvSpPr>
-            <p:cNvPr id="48" name="object 19"/>
-            <p:cNvSpPr/>
-            <p:nvPr/>
-          </p:nvSpPr>
-          <p:spPr>
-            <a:xfrm>
-              <a:off x="3924561" y="1396776"/>
-              <a:ext cx="2921635" cy="0"/>
-            </a:xfrm>
-            <a:custGeom>
-              <a:avLst/>
-              <a:gdLst/>
-              <a:ahLst/>
-              <a:cxnLst/>
-              <a:rect l="l" t="t" r="r" b="b"/>
-              <a:pathLst>
-                <a:path w="2921634">
-                  <a:moveTo>
-                    <a:pt x="0" y="0"/>
-                  </a:moveTo>
-                  <a:lnTo>
-                    <a:pt x="2921203" y="0"/>
-                  </a:lnTo>
-                </a:path>
-              </a:pathLst>
-            </a:custGeom>
-            <a:ln w="7124">
-              <a:solidFill>
-                <a:srgbClr val="005D9E"/>
-              </a:solidFill>
-            </a:ln>
-          </p:spPr>
-          <p:txBody>
-            <a:bodyPr wrap="square" lIns="0" tIns="0" rIns="0" bIns="0" rtlCol="0"/>
-            <a:lstStyle/>
-            <a:p>
-              <a:endParaRPr/>
-            </a:p>
-          </p:txBody>
-        </p:sp>
-        <p:sp>
-          <p:nvSpPr>
-            <p:cNvPr id="49" name="TextBox 48"/>
-            <p:cNvSpPr txBox="1"/>
-            <p:nvPr/>
-          </p:nvSpPr>
-          <p:spPr>
-            <a:xfrm>
-              <a:off x="3802302" y="1341373"/>
-              <a:ext cx="3192821" cy="392425"/>
-            </a:xfrm>
-            <a:prstGeom prst="rect">
-              <a:avLst/>
-            </a:prstGeom>
-            <a:noFill/>
-          </p:spPr>
-          <p:txBody>
-            <a:bodyPr wrap="none" rtlCol="0">
-              <a:spAutoFit/>
-            </a:bodyPr>
-            <a:lstStyle/>
-            <a:p>
-              <a:r>
-                <a:rPr lang="en-IN" sz="900" dirty="0">
-                  <a:solidFill>
-                    <a:srgbClr val="005D9E"/>
-                  </a:solidFill>
-                  <a:latin typeface="Economica"/>
-                  <a:cs typeface="Economica"/>
-                </a:rPr>
-                <a:t>De</a:t>
-              </a:r>
-              <a:r>
-                <a:rPr lang="en-IN" sz="900" spc="-15" dirty="0">
-                  <a:solidFill>
-                    <a:srgbClr val="005D9E"/>
-                  </a:solidFill>
-                  <a:latin typeface="Economica"/>
-                  <a:cs typeface="Economica"/>
-                </a:rPr>
-                <a:t>p</a:t>
-              </a:r>
-              <a:r>
-                <a:rPr lang="en-IN" sz="900" dirty="0">
-                  <a:solidFill>
-                    <a:srgbClr val="005D9E"/>
-                  </a:solidFill>
-                  <a:latin typeface="Economica"/>
-                  <a:cs typeface="Economica"/>
-                </a:rPr>
-                <a:t>a</a:t>
-              </a:r>
-              <a:r>
-                <a:rPr lang="en-IN" sz="900" spc="10" dirty="0">
-                  <a:solidFill>
-                    <a:srgbClr val="005D9E"/>
-                  </a:solidFill>
-                  <a:latin typeface="Economica"/>
-                  <a:cs typeface="Economica"/>
-                </a:rPr>
-                <a:t>r</a:t>
-              </a:r>
-              <a:r>
-                <a:rPr lang="en-IN" sz="900" dirty="0">
-                  <a:solidFill>
-                    <a:srgbClr val="005D9E"/>
-                  </a:solidFill>
-                  <a:latin typeface="Economica"/>
-                  <a:cs typeface="Economica"/>
-                </a:rPr>
-                <a:t>tment of Computa</a:t>
-              </a:r>
-              <a:r>
-                <a:rPr lang="en-IN" sz="900" spc="-10" dirty="0">
-                  <a:solidFill>
-                    <a:srgbClr val="005D9E"/>
-                  </a:solidFill>
-                  <a:latin typeface="Economica"/>
-                  <a:cs typeface="Economica"/>
-                </a:rPr>
-                <a:t>t</a:t>
-              </a:r>
-              <a:r>
-                <a:rPr lang="en-IN" sz="900" dirty="0">
-                  <a:solidFill>
-                    <a:srgbClr val="005D9E"/>
-                  </a:solidFill>
-                  <a:latin typeface="Economica"/>
-                  <a:cs typeface="Economica"/>
-                </a:rPr>
-                <a:t>ional and Data S</a:t>
-              </a:r>
-              <a:r>
-                <a:rPr lang="en-IN" sz="900" spc="-30" dirty="0">
-                  <a:solidFill>
-                    <a:srgbClr val="005D9E"/>
-                  </a:solidFill>
-                  <a:latin typeface="Economica"/>
-                  <a:cs typeface="Economica"/>
-                </a:rPr>
-                <a:t>c</a:t>
-              </a:r>
-              <a:r>
-                <a:rPr lang="en-IN" sz="900" dirty="0">
-                  <a:solidFill>
-                    <a:srgbClr val="005D9E"/>
-                  </a:solidFill>
-                  <a:latin typeface="Economica"/>
-                  <a:cs typeface="Economica"/>
-                </a:rPr>
-                <a:t>iences</a:t>
-              </a:r>
-              <a:endParaRPr lang="en-IN" sz="900" dirty="0">
-                <a:latin typeface="Economica"/>
-                <a:cs typeface="Economica"/>
-              </a:endParaRPr>
-            </a:p>
-          </p:txBody>
-        </p:sp>
-      </p:grpSp>
     </p:spTree>
     <p:extLst>
       <p:ext uri="{BB962C8B-B14F-4D97-AF65-F5344CB8AC3E}">
@@ -7806,6 +5739,250 @@
           </a:prstGeom>
         </p:spPr>
       </p:pic>
+      <p:pic>
+        <p:nvPicPr>
+          <p:cNvPr id="17" name="Picture 2" descr="Creative Commons License">
+            <a:extLst>
+              <a:ext uri="{FF2B5EF4-FFF2-40B4-BE49-F238E27FC236}">
+                <a16:creationId xmlns:a16="http://schemas.microsoft.com/office/drawing/2014/main" id="{615E1711-9529-4A5F-A5B5-CA5DA23661ED}"/>
+              </a:ext>
+            </a:extLst>
+          </p:cNvPr>
+          <p:cNvPicPr>
+            <a:picLocks noChangeAspect="1" noChangeArrowheads="1"/>
+          </p:cNvPicPr>
+          <p:nvPr userDrawn="1"/>
+        </p:nvPicPr>
+        <p:blipFill>
+          <a:blip r:embed="rId5">
+            <a:lum bright="70000" contrast="-70000"/>
+            <a:extLst>
+              <a:ext uri="{BEBA8EAE-BF5A-486C-A8C5-ECC9F3942E4B}">
+                <a14:imgProps xmlns:a14="http://schemas.microsoft.com/office/drawing/2010/main">
+                  <a14:imgLayer r:embed="rId6">
+                    <a14:imgEffect>
+                      <a14:colorTemperature colorTemp="8800"/>
+                    </a14:imgEffect>
+                  </a14:imgLayer>
+                </a14:imgProps>
+              </a:ext>
+              <a:ext uri="{28A0092B-C50C-407E-A947-70E740481C1C}">
+                <a14:useLocalDpi xmlns:a14="http://schemas.microsoft.com/office/drawing/2010/main" val="0"/>
+              </a:ext>
+            </a:extLst>
+          </a:blip>
+          <a:srcRect/>
+          <a:stretch>
+            <a:fillRect/>
+          </a:stretch>
+        </p:blipFill>
+        <p:spPr bwMode="auto">
+          <a:xfrm>
+            <a:off x="600334" y="6265502"/>
+            <a:ext cx="838200" cy="295275"/>
+          </a:xfrm>
+          <a:prstGeom prst="rect">
+            <a:avLst/>
+          </a:prstGeom>
+          <a:noFill/>
+          <a:extLst>
+            <a:ext uri="{909E8E84-426E-40DD-AFC4-6F175D3DCCD1}">
+              <a14:hiddenFill xmlns:a14="http://schemas.microsoft.com/office/drawing/2010/main">
+                <a:solidFill>
+                  <a:srgbClr val="FFFFFF"/>
+                </a:solidFill>
+              </a14:hiddenFill>
+            </a:ext>
+          </a:extLst>
+        </p:spPr>
+      </p:pic>
+      <p:sp>
+        <p:nvSpPr>
+          <p:cNvPr id="18" name="Rectangle 1">
+            <a:extLst>
+              <a:ext uri="{FF2B5EF4-FFF2-40B4-BE49-F238E27FC236}">
+                <a16:creationId xmlns:a16="http://schemas.microsoft.com/office/drawing/2014/main" id="{7493FBFD-41BF-46E4-B366-4D01110AA606}"/>
+              </a:ext>
+            </a:extLst>
+          </p:cNvPr>
+          <p:cNvSpPr>
+            <a:spLocks noChangeArrowheads="1"/>
+          </p:cNvSpPr>
+          <p:nvPr userDrawn="1"/>
+        </p:nvSpPr>
+        <p:spPr bwMode="auto">
+          <a:xfrm>
+            <a:off x="1435107" y="6116639"/>
+            <a:ext cx="5627182" cy="646331"/>
+          </a:xfrm>
+          <a:prstGeom prst="rect">
+            <a:avLst/>
+          </a:prstGeom>
+          <a:noFill/>
+          <a:ln>
+            <a:noFill/>
+          </a:ln>
+          <a:effectLst/>
+          <a:extLst>
+            <a:ext uri="{909E8E84-426E-40DD-AFC4-6F175D3DCCD1}">
+              <a14:hiddenFill xmlns:a14="http://schemas.microsoft.com/office/drawing/2010/main">
+                <a:solidFill>
+                  <a:schemeClr val="accent1"/>
+                </a:solidFill>
+              </a14:hiddenFill>
+            </a:ext>
+            <a:ext uri="{91240B29-F687-4F45-9708-019B960494DF}">
+              <a14:hiddenLine xmlns:a14="http://schemas.microsoft.com/office/drawing/2010/main" w="9525">
+                <a:solidFill>
+                  <a:schemeClr val="tx1"/>
+                </a:solidFill>
+                <a:miter lim="800000"/>
+                <a:headEnd/>
+                <a:tailEnd/>
+              </a14:hiddenLine>
+            </a:ext>
+            <a:ext uri="{AF507438-7753-43E0-B8FC-AC1667EBCBE1}">
+              <a14:hiddenEffects xmlns:a14="http://schemas.microsoft.com/office/drawing/2010/main">
+                <a:effectLst>
+                  <a:outerShdw dist="35921" dir="2700000" algn="ctr" rotWithShape="0">
+                    <a:schemeClr val="bg2"/>
+                  </a:outerShdw>
+                </a:effectLst>
+              </a14:hiddenEffects>
+            </a:ext>
+          </a:extLst>
+        </p:spPr>
+        <p:txBody>
+          <a:bodyPr vert="horz" wrap="square" lIns="91440" tIns="45720" rIns="91440" bIns="45720" numCol="1" anchor="ctr" anchorCtr="0" compatLnSpc="1">
+            <a:prstTxWarp prst="textNoShape">
+              <a:avLst/>
+            </a:prstTxWarp>
+            <a:spAutoFit/>
+          </a:bodyPr>
+          <a:lstStyle/>
+          <a:p>
+            <a:pPr lvl="0" eaLnBrk="0" fontAlgn="base" hangingPunct="0">
+              <a:spcBef>
+                <a:spcPct val="0"/>
+              </a:spcBef>
+              <a:spcAft>
+                <a:spcPct val="0"/>
+              </a:spcAft>
+            </a:pPr>
+            <a:r>
+              <a:rPr kumimoji="0" lang="en-US" sz="1200" b="0" i="1" u="none" strike="noStrike" cap="none" normalizeH="0" baseline="0" dirty="0">
+                <a:ln>
+                  <a:noFill/>
+                </a:ln>
+                <a:solidFill>
+                  <a:schemeClr val="tx2">
+                    <a:lumMod val="20000"/>
+                    <a:lumOff val="80000"/>
+                  </a:schemeClr>
+                </a:solidFill>
+                <a:effectLst/>
+                <a:latin typeface="+mn-lt"/>
+              </a:rPr>
+              <a:t>Slide Template Source: ©Department of Computational and Data Science, IISc, 2016</a:t>
+            </a:r>
+            <a:br>
+              <a:rPr kumimoji="0" lang="en-US" sz="1200" b="0" i="1" u="none" strike="noStrike" cap="none" normalizeH="0" baseline="0" dirty="0">
+                <a:ln>
+                  <a:noFill/>
+                </a:ln>
+                <a:solidFill>
+                  <a:schemeClr val="tx2">
+                    <a:lumMod val="20000"/>
+                    <a:lumOff val="80000"/>
+                  </a:schemeClr>
+                </a:solidFill>
+                <a:effectLst/>
+                <a:latin typeface="+mn-lt"/>
+              </a:rPr>
+            </a:br>
+            <a:r>
+              <a:rPr lang="en-IN" sz="1200" i="1" dirty="0">
+                <a:solidFill>
+                  <a:schemeClr val="tx2">
+                    <a:lumMod val="20000"/>
+                    <a:lumOff val="80000"/>
+                  </a:schemeClr>
+                </a:solidFill>
+                <a:latin typeface="+mn-lt"/>
+              </a:rPr>
+              <a:t>This work is licensed under a </a:t>
+            </a:r>
+            <a:r>
+              <a:rPr lang="en-IN" sz="1200" i="1" dirty="0">
+                <a:solidFill>
+                  <a:schemeClr val="tx2">
+                    <a:lumMod val="20000"/>
+                    <a:lumOff val="80000"/>
+                  </a:schemeClr>
+                </a:solidFill>
+                <a:latin typeface="+mn-lt"/>
+                <a:hlinkClick r:id="rId7"/>
+              </a:rPr>
+              <a:t>Creative Commons Attribution 4.0 International License</a:t>
+            </a:r>
+            <a:r>
+              <a:rPr kumimoji="0" lang="en-US" sz="1200" b="0" i="1" u="none" strike="noStrike" cap="none" normalizeH="0" baseline="0" dirty="0">
+                <a:ln>
+                  <a:noFill/>
+                </a:ln>
+                <a:solidFill>
+                  <a:schemeClr val="tx2">
+                    <a:lumMod val="20000"/>
+                    <a:lumOff val="80000"/>
+                  </a:schemeClr>
+                </a:solidFill>
+                <a:effectLst/>
+                <a:latin typeface="+mn-lt"/>
+              </a:rPr>
+              <a:t> </a:t>
+            </a:r>
+          </a:p>
+          <a:p>
+            <a:pPr lvl="0" eaLnBrk="0" fontAlgn="base" hangingPunct="0">
+              <a:spcBef>
+                <a:spcPct val="0"/>
+              </a:spcBef>
+              <a:spcAft>
+                <a:spcPct val="0"/>
+              </a:spcAft>
+            </a:pPr>
+            <a:r>
+              <a:rPr kumimoji="0" lang="en-IN" sz="1200" b="0" i="1" u="none" strike="noStrike" cap="none" normalizeH="0" baseline="0" dirty="0">
+                <a:ln>
+                  <a:noFill/>
+                </a:ln>
+                <a:solidFill>
+                  <a:schemeClr val="tx2">
+                    <a:lumMod val="20000"/>
+                    <a:lumOff val="80000"/>
+                  </a:schemeClr>
+                </a:solidFill>
+                <a:effectLst/>
+                <a:latin typeface="+mn-lt"/>
+              </a:rPr>
+              <a:t>Copyright for external content used with attribution is retained by their original authors</a:t>
+            </a:r>
+            <a:endParaRPr kumimoji="0" lang="en-US" sz="1200" b="0" i="1" u="none" strike="noStrike" cap="none" normalizeH="0" baseline="0" dirty="0">
+              <a:ln>
+                <a:noFill/>
+              </a:ln>
+              <a:solidFill>
+                <a:schemeClr val="tx2">
+                  <a:lumMod val="20000"/>
+                  <a:lumOff val="80000"/>
+                </a:schemeClr>
+              </a:solidFill>
+              <a:effectLst/>
+              <a:latin typeface="+mn-lt"/>
+            </a:endParaRPr>
+          </a:p>
+        </p:txBody>
+      </p:sp>
     </p:spTree>
     <p:extLst>
       <p:ext uri="{BB962C8B-B14F-4D97-AF65-F5344CB8AC3E}">

</xml_diff>